<commit_message>
Issue #49 (documentation): Updated figures and presentations according to style guide.
</commit_message>
<xml_diff>
--- a/examples/questionnaires/documentation/figures/correct-questionnaire-scenario.pptx
+++ b/examples/questionnaires/documentation/figures/correct-questionnaire-scenario.pptx
@@ -288,7 +288,7 @@
           <a:p>
             <a:fld id="{74D1DF45-AD1D-5C46-9F4A-CFDFF0B9F4DF}" type="datetimeFigureOut">
               <a:rPr lang="en-US" smtClean="0"/>
-              <a:t>05/08/15</a:t>
+              <a:t>27/11/15</a:t>
             </a:fld>
             <a:endParaRPr lang="en-GB"/>
           </a:p>
@@ -458,7 +458,7 @@
           <a:p>
             <a:fld id="{74D1DF45-AD1D-5C46-9F4A-CFDFF0B9F4DF}" type="datetimeFigureOut">
               <a:rPr lang="en-US" smtClean="0"/>
-              <a:t>05/08/15</a:t>
+              <a:t>27/11/15</a:t>
             </a:fld>
             <a:endParaRPr lang="en-GB"/>
           </a:p>
@@ -638,7 +638,7 @@
           <a:p>
             <a:fld id="{74D1DF45-AD1D-5C46-9F4A-CFDFF0B9F4DF}" type="datetimeFigureOut">
               <a:rPr lang="en-US" smtClean="0"/>
-              <a:t>05/08/15</a:t>
+              <a:t>27/11/15</a:t>
             </a:fld>
             <a:endParaRPr lang="en-GB"/>
           </a:p>
@@ -808,7 +808,7 @@
           <a:p>
             <a:fld id="{74D1DF45-AD1D-5C46-9F4A-CFDFF0B9F4DF}" type="datetimeFigureOut">
               <a:rPr lang="en-US" smtClean="0"/>
-              <a:t>05/08/15</a:t>
+              <a:t>27/11/15</a:t>
             </a:fld>
             <a:endParaRPr lang="en-GB"/>
           </a:p>
@@ -1054,7 +1054,7 @@
           <a:p>
             <a:fld id="{74D1DF45-AD1D-5C46-9F4A-CFDFF0B9F4DF}" type="datetimeFigureOut">
               <a:rPr lang="en-US" smtClean="0"/>
-              <a:t>05/08/15</a:t>
+              <a:t>27/11/15</a:t>
             </a:fld>
             <a:endParaRPr lang="en-GB"/>
           </a:p>
@@ -1342,7 +1342,7 @@
           <a:p>
             <a:fld id="{74D1DF45-AD1D-5C46-9F4A-CFDFF0B9F4DF}" type="datetimeFigureOut">
               <a:rPr lang="en-US" smtClean="0"/>
-              <a:t>05/08/15</a:t>
+              <a:t>27/11/15</a:t>
             </a:fld>
             <a:endParaRPr lang="en-GB"/>
           </a:p>
@@ -1764,7 +1764,7 @@
           <a:p>
             <a:fld id="{74D1DF45-AD1D-5C46-9F4A-CFDFF0B9F4DF}" type="datetimeFigureOut">
               <a:rPr lang="en-US" smtClean="0"/>
-              <a:t>05/08/15</a:t>
+              <a:t>27/11/15</a:t>
             </a:fld>
             <a:endParaRPr lang="en-GB"/>
           </a:p>
@@ -1882,7 +1882,7 @@
           <a:p>
             <a:fld id="{74D1DF45-AD1D-5C46-9F4A-CFDFF0B9F4DF}" type="datetimeFigureOut">
               <a:rPr lang="en-US" smtClean="0"/>
-              <a:t>05/08/15</a:t>
+              <a:t>27/11/15</a:t>
             </a:fld>
             <a:endParaRPr lang="en-GB"/>
           </a:p>
@@ -1977,7 +1977,7 @@
           <a:p>
             <a:fld id="{74D1DF45-AD1D-5C46-9F4A-CFDFF0B9F4DF}" type="datetimeFigureOut">
               <a:rPr lang="en-US" smtClean="0"/>
-              <a:t>05/08/15</a:t>
+              <a:t>27/11/15</a:t>
             </a:fld>
             <a:endParaRPr lang="en-GB"/>
           </a:p>
@@ -2254,7 +2254,7 @@
           <a:p>
             <a:fld id="{74D1DF45-AD1D-5C46-9F4A-CFDFF0B9F4DF}" type="datetimeFigureOut">
               <a:rPr lang="en-US" smtClean="0"/>
-              <a:t>05/08/15</a:t>
+              <a:t>27/11/15</a:t>
             </a:fld>
             <a:endParaRPr lang="en-GB"/>
           </a:p>
@@ -2507,7 +2507,7 @@
           <a:p>
             <a:fld id="{74D1DF45-AD1D-5C46-9F4A-CFDFF0B9F4DF}" type="datetimeFigureOut">
               <a:rPr lang="en-US" smtClean="0"/>
-              <a:t>05/08/15</a:t>
+              <a:t>27/11/15</a:t>
             </a:fld>
             <a:endParaRPr lang="en-GB"/>
           </a:p>
@@ -2720,7 +2720,7 @@
           <a:p>
             <a:fld id="{74D1DF45-AD1D-5C46-9F4A-CFDFF0B9F4DF}" type="datetimeFigureOut">
               <a:rPr lang="en-US" smtClean="0"/>
-              <a:t>05/08/15</a:t>
+              <a:t>27/11/15</a:t>
             </a:fld>
             <a:endParaRPr lang="en-GB"/>
           </a:p>
@@ -3104,9 +3104,9 @@
         <p:grpSpPr>
           <a:xfrm>
             <a:off x="1109871" y="2660070"/>
-            <a:ext cx="6839291" cy="4157234"/>
+            <a:ext cx="6839291" cy="4145653"/>
             <a:chOff x="335171" y="409114"/>
-            <a:chExt cx="8549114" cy="5196542"/>
+            <a:chExt cx="8549114" cy="5182066"/>
           </a:xfrm>
         </p:grpSpPr>
         <p:grpSp>
@@ -3252,8 +3252,8 @@
           </p:nvSpPr>
           <p:spPr>
             <a:xfrm>
-              <a:off x="335171" y="3666664"/>
-              <a:ext cx="2026920" cy="1938992"/>
+              <a:off x="335171" y="3789774"/>
+              <a:ext cx="2026920" cy="1692771"/>
             </a:xfrm>
             <a:prstGeom prst="rect">
               <a:avLst/>
@@ -3269,34 +3269,29 @@
               <a:pPr algn="ctr"/>
               <a:r>
                 <a:rPr lang="en-GB" sz="1100" b="1" dirty="0" smtClean="0">
-                  <a:latin typeface="Arial"/>
                   <a:cs typeface="Arial"/>
                 </a:rPr>
                 <a:t>(b)</a:t>
               </a:r>
               <a:r>
                 <a:rPr lang="en-GB" sz="1100" dirty="0" smtClean="0">
-                  <a:latin typeface="Arial"/>
                   <a:cs typeface="Arial"/>
                 </a:rPr>
                 <a:t> original GUI, without user input (all values undefined), first and nested group of second group not shown (question 9 &amp; 11 are undefined), the second group is always shown (constant </a:t>
               </a:r>
               <a:r>
                 <a:rPr lang="en-GB" sz="1100" i="1" dirty="0" smtClean="0">
-                  <a:latin typeface="Arial"/>
                   <a:cs typeface="Arial"/>
                 </a:rPr>
                 <a:t>true</a:t>
               </a:r>
               <a:r>
                 <a:rPr lang="en-GB" sz="1100" dirty="0" smtClean="0">
-                  <a:latin typeface="Arial"/>
                   <a:cs typeface="Arial"/>
                 </a:rPr>
                 <a:t>)</a:t>
               </a:r>
               <a:endParaRPr lang="en-GB" sz="1100" dirty="0">
-                <a:latin typeface="Arial"/>
                 <a:cs typeface="Arial"/>
               </a:endParaRPr>
             </a:p>
@@ -3310,7 +3305,7 @@
           </p:nvSpPr>
           <p:spPr>
             <a:xfrm>
-              <a:off x="2510418" y="4094202"/>
+              <a:off x="2510417" y="4083075"/>
               <a:ext cx="2026920" cy="1508105"/>
             </a:xfrm>
             <a:prstGeom prst="rect">
@@ -3327,34 +3322,29 @@
               <a:pPr algn="ctr"/>
               <a:r>
                 <a:rPr lang="en-GB" sz="1100" b="1" dirty="0" smtClean="0">
-                  <a:latin typeface="Arial"/>
                   <a:cs typeface="Arial"/>
                 </a:rPr>
                 <a:t>(c)</a:t>
               </a:r>
               <a:r>
                 <a:rPr lang="en-GB" sz="1100" dirty="0" smtClean="0">
-                  <a:latin typeface="Arial"/>
                   <a:cs typeface="Arial"/>
                 </a:rPr>
                 <a:t> after answering questions 1—8, first group shown (computed question 9 evaluates to </a:t>
               </a:r>
               <a:r>
                 <a:rPr lang="en-GB" sz="1100" i="1" dirty="0" smtClean="0">
-                  <a:latin typeface="Arial"/>
                   <a:cs typeface="Arial"/>
                 </a:rPr>
                 <a:t>true</a:t>
               </a:r>
               <a:r>
                 <a:rPr lang="en-GB" sz="1100" dirty="0" smtClean="0">
-                  <a:latin typeface="Arial"/>
                   <a:cs typeface="Arial"/>
                 </a:rPr>
                 <a:t>) shadowing the original question 11 with its computed version</a:t>
               </a:r>
               <a:endParaRPr lang="en-GB" sz="1100" dirty="0">
-                <a:latin typeface="Arial"/>
                 <a:cs typeface="Arial"/>
               </a:endParaRPr>
             </a:p>
@@ -3369,7 +3359,7 @@
           <p:spPr>
             <a:xfrm>
               <a:off x="4685665" y="4083075"/>
-              <a:ext cx="2026920" cy="1508105"/>
+              <a:ext cx="2026920" cy="1269579"/>
             </a:xfrm>
             <a:prstGeom prst="rect">
               <a:avLst/>
@@ -3385,34 +3375,29 @@
               <a:pPr algn="ctr"/>
               <a:r>
                 <a:rPr lang="en-GB" sz="1100" b="1" dirty="0" smtClean="0">
-                  <a:latin typeface="Arial"/>
                   <a:cs typeface="Arial"/>
                 </a:rPr>
                 <a:t>(d)</a:t>
               </a:r>
               <a:r>
                 <a:rPr lang="en-GB" sz="1100" dirty="0" smtClean="0">
-                  <a:latin typeface="Arial"/>
                   <a:cs typeface="Arial"/>
                 </a:rPr>
                 <a:t> after answering questions 10, question 11 is defined; its value is </a:t>
               </a:r>
               <a:r>
                 <a:rPr lang="en-GB" sz="1100" i="1" dirty="0" smtClean="0">
-                  <a:latin typeface="Arial"/>
                   <a:cs typeface="Arial"/>
                 </a:rPr>
                 <a:t>&gt; 9</a:t>
               </a:r>
               <a:r>
                 <a:rPr lang="en-GB" sz="1100" dirty="0" smtClean="0">
-                  <a:latin typeface="Arial"/>
                   <a:cs typeface="Arial"/>
                 </a:rPr>
                 <a:t> such that the nested group is shown and its question 12 shadows the original version</a:t>
               </a:r>
               <a:endParaRPr lang="en-GB" sz="1100" dirty="0">
-                <a:latin typeface="Arial"/>
                 <a:cs typeface="Arial"/>
               </a:endParaRPr>
             </a:p>
@@ -3426,8 +3411,8 @@
           </p:nvSpPr>
           <p:spPr>
             <a:xfrm>
-              <a:off x="6857365" y="4083075"/>
-              <a:ext cx="2026920" cy="1077218"/>
+              <a:off x="6857364" y="4083075"/>
+              <a:ext cx="2026920" cy="1077219"/>
             </a:xfrm>
             <a:prstGeom prst="rect">
               <a:avLst/>
@@ -3443,20 +3428,17 @@
               <a:pPr algn="ctr"/>
               <a:r>
                 <a:rPr lang="en-GB" sz="1100" b="1" dirty="0" smtClean="0">
-                  <a:latin typeface="Arial"/>
                   <a:cs typeface="Arial"/>
                 </a:rPr>
                 <a:t>(e)</a:t>
               </a:r>
               <a:r>
                 <a:rPr lang="en-GB" sz="1100" dirty="0" smtClean="0">
-                  <a:latin typeface="Arial"/>
                   <a:cs typeface="Arial"/>
                 </a:rPr>
                 <a:t> deselecting question 8 deactivates the first group, such that the original question 11 &amp;12 are active again</a:t>
               </a:r>
               <a:endParaRPr lang="en-GB" sz="1100" dirty="0">
-                <a:latin typeface="Arial"/>
                 <a:cs typeface="Arial"/>
               </a:endParaRPr>
             </a:p>
@@ -3518,20 +3500,17 @@
             <a:pPr algn="ctr"/>
             <a:r>
               <a:rPr lang="en-GB" sz="1100" b="1" dirty="0" smtClean="0">
-                <a:latin typeface="Arial"/>
                 <a:cs typeface="Arial"/>
               </a:rPr>
               <a:t>(a) </a:t>
             </a:r>
             <a:r>
               <a:rPr lang="en-GB" sz="1100" dirty="0" smtClean="0">
-                <a:latin typeface="Arial"/>
                 <a:cs typeface="Arial"/>
               </a:rPr>
               <a:t>questionnaire source code</a:t>
             </a:r>
             <a:endParaRPr lang="en-GB" sz="1100" dirty="0">
-              <a:latin typeface="Arial"/>
               <a:cs typeface="Arial"/>
             </a:endParaRPr>
           </a:p>
@@ -3551,7 +3530,7 @@
           <a:prstGeom prst="rightBrace">
             <a:avLst/>
           </a:prstGeom>
-          <a:ln w="12700">
+          <a:ln w="19050">
             <a:solidFill>
               <a:srgbClr val="FF0000"/>
             </a:solidFill>
@@ -3596,7 +3575,7 @@
           <a:prstGeom prst="line">
             <a:avLst/>
           </a:prstGeom>
-          <a:ln w="12700">
+          <a:ln w="19050">
             <a:solidFill>
               <a:srgbClr val="FF0000"/>
             </a:solidFill>
@@ -3635,7 +3614,7 @@
           <a:prstGeom prst="line">
             <a:avLst/>
           </a:prstGeom>
-          <a:ln w="12700">
+          <a:ln w="19050">
             <a:solidFill>
               <a:srgbClr val="FF0000"/>
             </a:solidFill>
@@ -3683,7 +3662,6 @@
             <a:pPr algn="ctr"/>
             <a:r>
               <a:rPr lang="en-GB" sz="1100" dirty="0" smtClean="0">
-                <a:latin typeface="Arial"/>
                 <a:cs typeface="Arial"/>
               </a:rPr>
               <a:t>second</a:t>
@@ -3693,13 +3671,11 @@
             <a:pPr algn="ctr"/>
             <a:r>
               <a:rPr lang="en-GB" sz="1100" dirty="0" smtClean="0">
-                <a:latin typeface="Arial"/>
                 <a:cs typeface="Arial"/>
               </a:rPr>
               <a:t>group</a:t>
             </a:r>
             <a:endParaRPr lang="en-GB" sz="1100" dirty="0">
-              <a:latin typeface="Arial"/>
               <a:cs typeface="Arial"/>
             </a:endParaRPr>
           </a:p>
@@ -3719,7 +3695,7 @@
           <a:prstGeom prst="rightBrace">
             <a:avLst/>
           </a:prstGeom>
-          <a:ln w="12700">
+          <a:ln w="19050">
             <a:solidFill>
               <a:srgbClr val="FF0000"/>
             </a:solidFill>
@@ -3775,7 +3751,6 @@
             <a:pPr algn="ctr"/>
             <a:r>
               <a:rPr lang="en-GB" sz="1100" dirty="0" smtClean="0">
-                <a:latin typeface="Arial"/>
                 <a:cs typeface="Arial"/>
               </a:rPr>
               <a:t>first</a:t>
@@ -3785,13 +3760,11 @@
             <a:pPr algn="ctr"/>
             <a:r>
               <a:rPr lang="en-GB" sz="1100" dirty="0" smtClean="0">
-                <a:latin typeface="Arial"/>
                 <a:cs typeface="Arial"/>
               </a:rPr>
               <a:t>group</a:t>
             </a:r>
             <a:endParaRPr lang="en-GB" sz="1100" dirty="0">
-              <a:latin typeface="Arial"/>
               <a:cs typeface="Arial"/>
             </a:endParaRPr>
           </a:p>
@@ -3811,7 +3784,7 @@
           <a:prstGeom prst="line">
             <a:avLst/>
           </a:prstGeom>
-          <a:ln w="12700">
+          <a:ln w="19050">
             <a:solidFill>
               <a:srgbClr val="FF0000"/>
             </a:solidFill>
@@ -3848,7 +3821,7 @@
           <a:prstGeom prst="line">
             <a:avLst/>
           </a:prstGeom>
-          <a:ln w="12700">
+          <a:ln w="19050">
             <a:solidFill>
               <a:srgbClr val="FF0000"/>
             </a:solidFill>
@@ -3885,7 +3858,7 @@
           <a:prstGeom prst="rightBrace">
             <a:avLst/>
           </a:prstGeom>
-          <a:ln w="12700">
+          <a:ln w="19050">
             <a:solidFill>
               <a:srgbClr val="FF0000"/>
             </a:solidFill>
@@ -3941,7 +3914,6 @@
             <a:pPr algn="ctr"/>
             <a:r>
               <a:rPr lang="en-GB" sz="1100" dirty="0" smtClean="0">
-                <a:latin typeface="Arial"/>
                 <a:cs typeface="Arial"/>
               </a:rPr>
               <a:t>nested</a:t>
@@ -3951,7 +3923,6 @@
             <a:pPr algn="ctr"/>
             <a:r>
               <a:rPr lang="en-GB" sz="1100" dirty="0" smtClean="0">
-                <a:latin typeface="Arial"/>
                 <a:cs typeface="Arial"/>
               </a:rPr>
               <a:t>group of</a:t>
@@ -3961,7 +3932,6 @@
             <a:pPr algn="ctr"/>
             <a:r>
               <a:rPr lang="en-GB" sz="1100" dirty="0" smtClean="0">
-                <a:latin typeface="Arial"/>
                 <a:cs typeface="Arial"/>
               </a:rPr>
               <a:t>second</a:t>
@@ -3971,13 +3941,11 @@
             <a:pPr algn="ctr"/>
             <a:r>
               <a:rPr lang="en-GB" sz="1100" dirty="0" smtClean="0">
-                <a:latin typeface="Arial"/>
                 <a:cs typeface="Arial"/>
               </a:rPr>
               <a:t>group</a:t>
             </a:r>
             <a:endParaRPr lang="en-GB" sz="1100" dirty="0">
-              <a:latin typeface="Arial"/>
               <a:cs typeface="Arial"/>
             </a:endParaRPr>
           </a:p>
@@ -3998,7 +3966,7 @@
             <a:avLst/>
           </a:prstGeom>
           <a:noFill/>
-          <a:ln w="12700">
+          <a:ln w="19050">
             <a:solidFill>
               <a:srgbClr val="3366FF"/>
             </a:solidFill>
@@ -4054,13 +4022,11 @@
             <a:pPr algn="r"/>
             <a:r>
               <a:rPr lang="en-GB" sz="1100" dirty="0" smtClean="0">
-                <a:latin typeface="Arial"/>
                 <a:cs typeface="Arial"/>
               </a:rPr>
               <a:t>ordinary question</a:t>
             </a:r>
             <a:endParaRPr lang="en-GB" sz="1100" dirty="0">
-              <a:latin typeface="Arial"/>
               <a:cs typeface="Arial"/>
             </a:endParaRPr>
           </a:p>
@@ -4091,13 +4057,11 @@
             <a:pPr algn="r"/>
             <a:r>
               <a:rPr lang="en-GB" sz="1100" dirty="0" smtClean="0">
-                <a:latin typeface="Arial"/>
                 <a:cs typeface="Arial"/>
               </a:rPr>
               <a:t>computed question</a:t>
             </a:r>
             <a:endParaRPr lang="en-GB" sz="1100" dirty="0">
-              <a:latin typeface="Arial"/>
               <a:cs typeface="Arial"/>
             </a:endParaRPr>
           </a:p>
@@ -4128,20 +4092,17 @@
             <a:pPr algn="r"/>
             <a:r>
               <a:rPr lang="en-GB" sz="1100" dirty="0">
-                <a:latin typeface="Arial"/>
                 <a:cs typeface="Arial"/>
               </a:rPr>
               <a:t>q</a:t>
             </a:r>
             <a:r>
               <a:rPr lang="en-GB" sz="1100" dirty="0" smtClean="0">
-                <a:latin typeface="Arial"/>
                 <a:cs typeface="Arial"/>
               </a:rPr>
               <a:t>uestion name (variable)</a:t>
             </a:r>
             <a:endParaRPr lang="en-GB" sz="1100" dirty="0">
-              <a:latin typeface="Arial"/>
               <a:cs typeface="Arial"/>
             </a:endParaRPr>
           </a:p>
@@ -4172,20 +4133,11 @@
             <a:pPr algn="r"/>
             <a:r>
               <a:rPr lang="en-GB" sz="1100" dirty="0" smtClean="0">
-                <a:latin typeface="Arial"/>
                 <a:cs typeface="Arial"/>
               </a:rPr>
-              <a:t>label </a:t>
-            </a:r>
-            <a:r>
-              <a:rPr lang="en-GB" sz="1100" dirty="0" smtClean="0">
-                <a:latin typeface="Arial"/>
-                <a:cs typeface="Arial"/>
-              </a:rPr>
-              <a:t>shown to user</a:t>
+              <a:t>label shown to user</a:t>
             </a:r>
             <a:endParaRPr lang="en-GB" sz="1100" dirty="0">
-              <a:latin typeface="Arial"/>
               <a:cs typeface="Arial"/>
             </a:endParaRPr>
           </a:p>
@@ -4216,13 +4168,11 @@
             <a:pPr algn="r"/>
             <a:r>
               <a:rPr lang="en-GB" sz="1100" dirty="0" smtClean="0">
-                <a:latin typeface="Arial"/>
                 <a:cs typeface="Arial"/>
               </a:rPr>
               <a:t>expression of computation</a:t>
             </a:r>
             <a:endParaRPr lang="en-GB" sz="1100" dirty="0">
-              <a:latin typeface="Arial"/>
               <a:cs typeface="Arial"/>
             </a:endParaRPr>
           </a:p>
@@ -4245,7 +4195,7 @@
           <a:prstGeom prst="line">
             <a:avLst/>
           </a:prstGeom>
-          <a:ln w="12700">
+          <a:ln w="19050">
             <a:solidFill>
               <a:srgbClr val="3366FF"/>
             </a:solidFill>
@@ -4283,7 +4233,7 @@
             <a:avLst/>
           </a:prstGeom>
           <a:noFill/>
-          <a:ln w="12700">
+          <a:ln w="19050">
             <a:solidFill>
               <a:srgbClr val="3366FF"/>
             </a:solidFill>
@@ -4331,7 +4281,7 @@
           <a:prstGeom prst="line">
             <a:avLst/>
           </a:prstGeom>
-          <a:ln w="12700">
+          <a:ln w="19050">
             <a:solidFill>
               <a:srgbClr val="3366FF"/>
             </a:solidFill>
@@ -4369,7 +4319,7 @@
             <a:avLst/>
           </a:prstGeom>
           <a:noFill/>
-          <a:ln w="12700">
+          <a:ln w="19050">
             <a:solidFill>
               <a:srgbClr val="3366FF"/>
             </a:solidFill>
@@ -4417,7 +4367,7 @@
           <a:prstGeom prst="line">
             <a:avLst/>
           </a:prstGeom>
-          <a:ln w="12700">
+          <a:ln w="19050">
             <a:solidFill>
               <a:srgbClr val="3366FF"/>
             </a:solidFill>
@@ -4455,7 +4405,7 @@
             <a:avLst/>
           </a:prstGeom>
           <a:noFill/>
-          <a:ln w="12700">
+          <a:ln w="19050">
             <a:solidFill>
               <a:srgbClr val="3366FF"/>
             </a:solidFill>
@@ -4501,7 +4451,7 @@
             <a:avLst/>
           </a:prstGeom>
           <a:noFill/>
-          <a:ln w="12700">
+          <a:ln w="19050">
             <a:solidFill>
               <a:srgbClr val="3366FF"/>
             </a:solidFill>
@@ -4557,34 +4507,11 @@
             <a:pPr algn="r"/>
             <a:r>
               <a:rPr lang="en-GB" sz="1100" dirty="0" smtClean="0">
-                <a:latin typeface="Arial"/>
                 <a:cs typeface="Arial"/>
               </a:rPr>
-              <a:t>e</a:t>
-            </a:r>
-            <a:r>
-              <a:rPr lang="en-GB" sz="1100" dirty="0" smtClean="0">
-                <a:latin typeface="Arial"/>
-                <a:cs typeface="Arial"/>
-              </a:rPr>
-              <a:t>xpect</a:t>
-            </a:r>
-            <a:r>
-              <a:rPr lang="en-GB" sz="1100" dirty="0" smtClean="0">
-                <a:latin typeface="Arial"/>
-                <a:cs typeface="Arial"/>
-              </a:rPr>
-              <a:t>ed</a:t>
-            </a:r>
-            <a:r>
-              <a:rPr lang="en-GB" sz="1100" dirty="0" smtClean="0">
-                <a:latin typeface="Arial"/>
-                <a:cs typeface="Arial"/>
-              </a:rPr>
-              <a:t> type of answer</a:t>
+              <a:t>expected type of answer</a:t>
             </a:r>
             <a:endParaRPr lang="en-GB" sz="1100" dirty="0">
-              <a:latin typeface="Arial"/>
               <a:cs typeface="Arial"/>
             </a:endParaRPr>
           </a:p>
@@ -4607,7 +4534,7 @@
           <a:prstGeom prst="line">
             <a:avLst/>
           </a:prstGeom>
-          <a:ln w="12700">
+          <a:ln w="19050">
             <a:solidFill>
               <a:srgbClr val="3366FF"/>
             </a:solidFill>
@@ -4647,7 +4574,7 @@
           <a:prstGeom prst="line">
             <a:avLst/>
           </a:prstGeom>
-          <a:ln w="12700">
+          <a:ln w="19050">
             <a:solidFill>
               <a:srgbClr val="3366FF"/>
             </a:solidFill>
@@ -4685,7 +4612,7 @@
             <a:avLst/>
           </a:prstGeom>
           <a:noFill/>
-          <a:ln w="12700">
+          <a:ln w="19050">
             <a:solidFill>
               <a:srgbClr val="3366FF"/>
             </a:solidFill>
@@ -4733,7 +4660,7 @@
           <a:prstGeom prst="line">
             <a:avLst/>
           </a:prstGeom>
-          <a:ln w="12700">
+          <a:ln w="19050">
             <a:solidFill>
               <a:srgbClr val="3366FF"/>
             </a:solidFill>

</xml_diff>

<commit_message>
Fixed issue #39 (overview of ttc-2015-fuml-activity-diagrams): Addd entry to the examples overview page.
</commit_message>
<xml_diff>
--- a/examples/questionnaires/documentation/figures/correct-questionnaire-scenario.pptx
+++ b/examples/questionnaires/documentation/figures/correct-questionnaire-scenario.pptx
@@ -288,7 +288,7 @@
           <a:p>
             <a:fld id="{74D1DF45-AD1D-5C46-9F4A-CFDFF0B9F4DF}" type="datetimeFigureOut">
               <a:rPr lang="en-US" smtClean="0"/>
-              <a:t>27/11/15</a:t>
+              <a:t>03/02/16</a:t>
             </a:fld>
             <a:endParaRPr lang="en-GB"/>
           </a:p>
@@ -458,7 +458,7 @@
           <a:p>
             <a:fld id="{74D1DF45-AD1D-5C46-9F4A-CFDFF0B9F4DF}" type="datetimeFigureOut">
               <a:rPr lang="en-US" smtClean="0"/>
-              <a:t>27/11/15</a:t>
+              <a:t>03/02/16</a:t>
             </a:fld>
             <a:endParaRPr lang="en-GB"/>
           </a:p>
@@ -638,7 +638,7 @@
           <a:p>
             <a:fld id="{74D1DF45-AD1D-5C46-9F4A-CFDFF0B9F4DF}" type="datetimeFigureOut">
               <a:rPr lang="en-US" smtClean="0"/>
-              <a:t>27/11/15</a:t>
+              <a:t>03/02/16</a:t>
             </a:fld>
             <a:endParaRPr lang="en-GB"/>
           </a:p>
@@ -808,7 +808,7 @@
           <a:p>
             <a:fld id="{74D1DF45-AD1D-5C46-9F4A-CFDFF0B9F4DF}" type="datetimeFigureOut">
               <a:rPr lang="en-US" smtClean="0"/>
-              <a:t>27/11/15</a:t>
+              <a:t>03/02/16</a:t>
             </a:fld>
             <a:endParaRPr lang="en-GB"/>
           </a:p>
@@ -1054,7 +1054,7 @@
           <a:p>
             <a:fld id="{74D1DF45-AD1D-5C46-9F4A-CFDFF0B9F4DF}" type="datetimeFigureOut">
               <a:rPr lang="en-US" smtClean="0"/>
-              <a:t>27/11/15</a:t>
+              <a:t>03/02/16</a:t>
             </a:fld>
             <a:endParaRPr lang="en-GB"/>
           </a:p>
@@ -1342,7 +1342,7 @@
           <a:p>
             <a:fld id="{74D1DF45-AD1D-5C46-9F4A-CFDFF0B9F4DF}" type="datetimeFigureOut">
               <a:rPr lang="en-US" smtClean="0"/>
-              <a:t>27/11/15</a:t>
+              <a:t>03/02/16</a:t>
             </a:fld>
             <a:endParaRPr lang="en-GB"/>
           </a:p>
@@ -1764,7 +1764,7 @@
           <a:p>
             <a:fld id="{74D1DF45-AD1D-5C46-9F4A-CFDFF0B9F4DF}" type="datetimeFigureOut">
               <a:rPr lang="en-US" smtClean="0"/>
-              <a:t>27/11/15</a:t>
+              <a:t>03/02/16</a:t>
             </a:fld>
             <a:endParaRPr lang="en-GB"/>
           </a:p>
@@ -1882,7 +1882,7 @@
           <a:p>
             <a:fld id="{74D1DF45-AD1D-5C46-9F4A-CFDFF0B9F4DF}" type="datetimeFigureOut">
               <a:rPr lang="en-US" smtClean="0"/>
-              <a:t>27/11/15</a:t>
+              <a:t>03/02/16</a:t>
             </a:fld>
             <a:endParaRPr lang="en-GB"/>
           </a:p>
@@ -1977,7 +1977,7 @@
           <a:p>
             <a:fld id="{74D1DF45-AD1D-5C46-9F4A-CFDFF0B9F4DF}" type="datetimeFigureOut">
               <a:rPr lang="en-US" smtClean="0"/>
-              <a:t>27/11/15</a:t>
+              <a:t>03/02/16</a:t>
             </a:fld>
             <a:endParaRPr lang="en-GB"/>
           </a:p>
@@ -2254,7 +2254,7 @@
           <a:p>
             <a:fld id="{74D1DF45-AD1D-5C46-9F4A-CFDFF0B9F4DF}" type="datetimeFigureOut">
               <a:rPr lang="en-US" smtClean="0"/>
-              <a:t>27/11/15</a:t>
+              <a:t>03/02/16</a:t>
             </a:fld>
             <a:endParaRPr lang="en-GB"/>
           </a:p>
@@ -2507,7 +2507,7 @@
           <a:p>
             <a:fld id="{74D1DF45-AD1D-5C46-9F4A-CFDFF0B9F4DF}" type="datetimeFigureOut">
               <a:rPr lang="en-US" smtClean="0"/>
-              <a:t>27/11/15</a:t>
+              <a:t>03/02/16</a:t>
             </a:fld>
             <a:endParaRPr lang="en-GB"/>
           </a:p>
@@ -2720,7 +2720,7 @@
           <a:p>
             <a:fld id="{74D1DF45-AD1D-5C46-9F4A-CFDFF0B9F4DF}" type="datetimeFigureOut">
               <a:rPr lang="en-US" smtClean="0"/>
-              <a:t>27/11/15</a:t>
+              <a:t>03/02/16</a:t>
             </a:fld>
             <a:endParaRPr lang="en-GB"/>
           </a:p>
@@ -3436,7 +3436,31 @@
                 <a:rPr lang="en-GB" sz="1100" dirty="0" smtClean="0">
                   <a:cs typeface="Arial"/>
                 </a:rPr>
-                <a:t> deselecting question 8 deactivates the first group, such that the original question 11 &amp;12 are active again</a:t>
+                <a:t> deselecting question 8 deactivates the first group, such that the original </a:t>
+              </a:r>
+              <a:r>
+                <a:rPr lang="en-GB" sz="1100" dirty="0" smtClean="0">
+                  <a:cs typeface="Arial"/>
+                </a:rPr>
+                <a:t>questions </a:t>
+              </a:r>
+              <a:r>
+                <a:rPr lang="en-GB" sz="1100" dirty="0" smtClean="0">
+                  <a:cs typeface="Arial"/>
+                </a:rPr>
+                <a:t>11 </a:t>
+              </a:r>
+              <a:r>
+                <a:rPr lang="en-GB" sz="1100" dirty="0" smtClean="0">
+                  <a:cs typeface="Arial"/>
+                </a:rPr>
+                <a:t>&amp; 12 </a:t>
+              </a:r>
+              <a:r>
+                <a:rPr lang="en-GB" sz="1100" dirty="0" smtClean="0">
+                  <a:cs typeface="Arial"/>
+                </a:rPr>
+                <a:t>are active again</a:t>
               </a:r>
               <a:endParaRPr lang="en-GB" sz="1100" dirty="0">
                 <a:cs typeface="Arial"/>

</xml_diff>